<commit_message>
Latest version of C level presentation
</commit_message>
<xml_diff>
--- a/Budweiser C level presentation.pptx
+++ b/Budweiser C level presentation.pptx
@@ -24098,8 +24098,8 @@
         </p:nvSpPr>
         <p:spPr>
           <a:xfrm>
-            <a:off x="3565256" y="1501551"/>
-            <a:ext cx="3857081" cy="646331"/>
+            <a:off x="3504454" y="1553251"/>
+            <a:ext cx="3715498" cy="646331"/>
           </a:xfrm>
           <a:prstGeom prst="rect">
             <a:avLst/>
@@ -24114,7 +24114,7 @@
           <a:p>
             <a:r>
               <a:rPr lang="en-US" dirty="0"/>
-              <a:t>IBU increases with alcohol between 5% and 7% also 8% and 10%</a:t>
+              <a:t>IBU increases with ABV between 5% and 7% also 8% and 10%</a:t>
             </a:r>
           </a:p>
         </p:txBody>

</xml_diff>